<commit_message>
Add Import implementation to DG
</commit_message>
<xml_diff>
--- a/docs/diagrams/SDforExport.pptx
+++ b/docs/diagrams/SDforExport.pptx
@@ -3949,7 +3949,7 @@
         </p:nvSpPr>
         <p:spPr>
           <a:xfrm>
-            <a:off x="5316783" y="607926"/>
+            <a:off x="5479343" y="607926"/>
             <a:ext cx="1093635" cy="346760"/>
           </a:xfrm>
           <a:prstGeom prst="rect">
@@ -4014,7 +4014,7 @@
         </p:nvCxnSpPr>
         <p:spPr>
           <a:xfrm>
-            <a:off x="6112982" y="971597"/>
+            <a:off x="6275542" y="971597"/>
             <a:ext cx="0" cy="1723059"/>
           </a:xfrm>
           <a:prstGeom prst="line">
@@ -4057,7 +4057,7 @@
         </p:nvSpPr>
         <p:spPr>
           <a:xfrm>
-            <a:off x="6036578" y="1534012"/>
+            <a:off x="6199138" y="1534012"/>
             <a:ext cx="142006" cy="664054"/>
           </a:xfrm>
           <a:prstGeom prst="rect">
@@ -4156,7 +4156,7 @@
         </p:nvSpPr>
         <p:spPr>
           <a:xfrm>
-            <a:off x="539543" y="1391176"/>
+            <a:off x="551934" y="1375759"/>
             <a:ext cx="1119851" cy="507831"/>
           </a:xfrm>
           <a:prstGeom prst="rect">
@@ -4171,12 +4171,8 @@
           <a:lstStyle/>
           <a:p>
             <a:r>
-              <a:rPr lang="en-US" sz="1100" dirty="0" err="1"/>
-              <a:t>changepic</a:t>
-            </a:r>
-            <a:r>
               <a:rPr lang="en-US" sz="1100" dirty="0"/>
-              <a:t> C:/Users/Admin/ members.csv</a:t>
+              <a:t>export C:/Users/Admin/ members.csv</a:t>
             </a:r>
           </a:p>
         </p:txBody>
@@ -4279,9 +4275,9 @@
           <p:nvPr/>
         </p:nvCxnSpPr>
         <p:spPr>
-          <a:xfrm>
-            <a:off x="3797187" y="1538408"/>
-            <a:ext cx="2236858" cy="13469"/>
+          <a:xfrm flipV="1">
+            <a:off x="3797187" y="1534012"/>
+            <a:ext cx="2412753" cy="4396"/>
           </a:xfrm>
           <a:prstGeom prst="straightConnector1">
             <a:avLst/>
@@ -4322,8 +4318,8 @@
         </p:nvSpPr>
         <p:spPr>
           <a:xfrm>
-            <a:off x="3806200" y="1551877"/>
-            <a:ext cx="2234771" cy="430887"/>
+            <a:off x="3770560" y="1572197"/>
+            <a:ext cx="2439380" cy="430887"/>
           </a:xfrm>
           <a:prstGeom prst="rect">
             <a:avLst/>
@@ -4351,7 +4347,7 @@
                   <a:srgbClr val="7030A0"/>
                 </a:solidFill>
               </a:rPr>
-              <a:t> (“C:/Users/Admin/photo.png”)</a:t>
+              <a:t> (“C:/Users/Admin/members.csv”)</a:t>
             </a:r>
           </a:p>
         </p:txBody>
@@ -4370,7 +4366,7 @@
         </p:nvSpPr>
         <p:spPr>
           <a:xfrm>
-            <a:off x="6202646" y="1668146"/>
+            <a:off x="6365206" y="1668146"/>
             <a:ext cx="2712754" cy="215444"/>
           </a:xfrm>
           <a:prstGeom prst="rect">
@@ -4428,13 +4424,14 @@
           </p:cNvPr>
           <p:cNvCxnSpPr>
             <a:cxnSpLocks/>
+            <a:endCxn id="17" idx="2"/>
           </p:cNvCxnSpPr>
           <p:nvPr/>
         </p:nvCxnSpPr>
         <p:spPr>
           <a:xfrm>
             <a:off x="3797187" y="2185406"/>
-            <a:ext cx="2298813" cy="13469"/>
+            <a:ext cx="2472954" cy="12660"/>
           </a:xfrm>
           <a:prstGeom prst="straightConnector1">
             <a:avLst/>
@@ -4565,7 +4562,7 @@
         </p:nvSpPr>
         <p:spPr>
           <a:xfrm>
-            <a:off x="7696200" y="591251"/>
+            <a:off x="7858760" y="591251"/>
             <a:ext cx="1371600" cy="346760"/>
           </a:xfrm>
           <a:prstGeom prst="rect">
@@ -4642,7 +4639,7 @@
         </p:nvCxnSpPr>
         <p:spPr>
           <a:xfrm>
-            <a:off x="8935456" y="944305"/>
+            <a:off x="9098016" y="944305"/>
             <a:ext cx="0" cy="1723059"/>
           </a:xfrm>
           <a:prstGeom prst="line">
@@ -4687,7 +4684,7 @@
         </p:nvSpPr>
         <p:spPr>
           <a:xfrm>
-            <a:off x="8865711" y="1956806"/>
+            <a:off x="9028271" y="1956806"/>
             <a:ext cx="142006" cy="176787"/>
           </a:xfrm>
           <a:prstGeom prst="rect">
@@ -4750,7 +4747,7 @@
         </p:nvCxnSpPr>
         <p:spPr>
           <a:xfrm>
-            <a:off x="6178584" y="1961202"/>
+            <a:off x="6341144" y="1961202"/>
             <a:ext cx="2691523" cy="0"/>
           </a:xfrm>
           <a:prstGeom prst="straightConnector1">
@@ -4795,7 +4792,7 @@
         </p:nvCxnSpPr>
         <p:spPr>
           <a:xfrm flipV="1">
-            <a:off x="6181383" y="2133593"/>
+            <a:off x="6343943" y="2133593"/>
             <a:ext cx="2755331" cy="4396"/>
           </a:xfrm>
           <a:prstGeom prst="straightConnector1">

</xml_diff>